<commit_message>
updates made to project files
</commit_message>
<xml_diff>
--- a/ML UnsupervisedLearning_AfolabiAbimbola.pptx
+++ b/ML UnsupervisedLearning_AfolabiAbimbola.pptx
@@ -5,7 +5,7 @@
     <p:sldMasterId id="2147483670" r:id="rId1"/>
   </p:sldMasterIdLst>
   <p:notesMasterIdLst>
-    <p:notesMasterId r:id="rId14"/>
+    <p:notesMasterId r:id="rId16"/>
   </p:notesMasterIdLst>
   <p:sldIdLst>
     <p:sldId id="256" r:id="rId2"/>
@@ -13,13 +13,15 @@
     <p:sldId id="316" r:id="rId4"/>
     <p:sldId id="330" r:id="rId5"/>
     <p:sldId id="325" r:id="rId6"/>
-    <p:sldId id="327" r:id="rId7"/>
-    <p:sldId id="334" r:id="rId8"/>
-    <p:sldId id="331" r:id="rId9"/>
-    <p:sldId id="333" r:id="rId10"/>
-    <p:sldId id="335" r:id="rId11"/>
-    <p:sldId id="322" r:id="rId12"/>
-    <p:sldId id="321" r:id="rId13"/>
+    <p:sldId id="336" r:id="rId7"/>
+    <p:sldId id="327" r:id="rId8"/>
+    <p:sldId id="334" r:id="rId9"/>
+    <p:sldId id="331" r:id="rId10"/>
+    <p:sldId id="333" r:id="rId11"/>
+    <p:sldId id="335" r:id="rId12"/>
+    <p:sldId id="337" r:id="rId13"/>
+    <p:sldId id="322" r:id="rId14"/>
+    <p:sldId id="321" r:id="rId15"/>
   </p:sldIdLst>
   <p:sldSz cx="9144000" cy="5143500" type="screen16x9"/>
   <p:notesSz cx="6858000" cy="9144000"/>
@@ -4689,7 +4691,7 @@
           <a:p>
             <a:fld id="{F7BA5667-12EF-44EA-9530-D84FE9572A6B}" type="datetimeFigureOut">
               <a:rPr lang="en-US" smtClean="0"/>
-              <a:t>8/28/2023</a:t>
+              <a:t>8/31/2023</a:t>
             </a:fld>
             <a:endParaRPr lang="en-US"/>
           </a:p>
@@ -9025,6 +9027,266 @@
           <p:cNvPr id="2" name="Title 1">
             <a:extLst>
               <a:ext uri="{FF2B5EF4-FFF2-40B4-BE49-F238E27FC236}">
+                <a16:creationId xmlns:a16="http://schemas.microsoft.com/office/drawing/2014/main" id="{F99DA8C7-737E-29AF-3BA3-6D58A54486CD}"/>
+              </a:ext>
+            </a:extLst>
+          </p:cNvPr>
+          <p:cNvSpPr>
+            <a:spLocks noGrp="1"/>
+          </p:cNvSpPr>
+          <p:nvPr>
+            <p:ph type="title"/>
+          </p:nvPr>
+        </p:nvSpPr>
+        <p:spPr/>
+        <p:txBody>
+          <a:bodyPr>
+            <a:normAutofit fontScale="90000"/>
+          </a:bodyPr>
+          <a:lstStyle/>
+          <a:p>
+            <a:r>
+              <a:rPr lang="en-US" dirty="0"/>
+              <a:t>Result of Clustering – K-Means &amp; Hierarchical</a:t>
+            </a:r>
+          </a:p>
+        </p:txBody>
+      </p:sp>
+      <p:sp>
+        <p:nvSpPr>
+          <p:cNvPr id="12" name="TextBox 11">
+            <a:extLst>
+              <a:ext uri="{FF2B5EF4-FFF2-40B4-BE49-F238E27FC236}">
+                <a16:creationId xmlns:a16="http://schemas.microsoft.com/office/drawing/2014/main" id="{D037D60A-3D91-A6D8-82F9-41331E6A2313}"/>
+              </a:ext>
+            </a:extLst>
+          </p:cNvPr>
+          <p:cNvSpPr txBox="1"/>
+          <p:nvPr/>
+        </p:nvSpPr>
+        <p:spPr>
+          <a:xfrm>
+            <a:off x="1909281" y="4698475"/>
+            <a:ext cx="1194179" cy="307777"/>
+          </a:xfrm>
+          <a:prstGeom prst="rect">
+            <a:avLst/>
+          </a:prstGeom>
+          <a:noFill/>
+        </p:spPr>
+        <p:txBody>
+          <a:bodyPr wrap="square">
+            <a:spAutoFit/>
+          </a:bodyPr>
+          <a:lstStyle/>
+          <a:p>
+            <a:r>
+              <a:rPr lang="en-US" dirty="0"/>
+              <a:t>K-Means</a:t>
+            </a:r>
+          </a:p>
+        </p:txBody>
+      </p:sp>
+      <p:sp>
+        <p:nvSpPr>
+          <p:cNvPr id="13" name="TextBox 12">
+            <a:extLst>
+              <a:ext uri="{FF2B5EF4-FFF2-40B4-BE49-F238E27FC236}">
+                <a16:creationId xmlns:a16="http://schemas.microsoft.com/office/drawing/2014/main" id="{A3FC82B7-AD11-C0DB-16C4-01A1FD87A27D}"/>
+              </a:ext>
+            </a:extLst>
+          </p:cNvPr>
+          <p:cNvSpPr txBox="1"/>
+          <p:nvPr/>
+        </p:nvSpPr>
+        <p:spPr>
+          <a:xfrm>
+            <a:off x="6412329" y="4544586"/>
+            <a:ext cx="1241946" cy="307777"/>
+          </a:xfrm>
+          <a:prstGeom prst="rect">
+            <a:avLst/>
+          </a:prstGeom>
+          <a:noFill/>
+        </p:spPr>
+        <p:txBody>
+          <a:bodyPr wrap="square">
+            <a:spAutoFit/>
+          </a:bodyPr>
+          <a:lstStyle/>
+          <a:p>
+            <a:r>
+              <a:rPr lang="en-US" dirty="0"/>
+              <a:t>Hierarchical</a:t>
+            </a:r>
+          </a:p>
+        </p:txBody>
+      </p:sp>
+      <p:pic>
+        <p:nvPicPr>
+          <p:cNvPr id="4" name="Picture 3">
+            <a:extLst>
+              <a:ext uri="{FF2B5EF4-FFF2-40B4-BE49-F238E27FC236}">
+                <a16:creationId xmlns:a16="http://schemas.microsoft.com/office/drawing/2014/main" id="{ED79CC1F-8DC3-53E2-4DCF-AAB0EE5EA5B7}"/>
+              </a:ext>
+            </a:extLst>
+          </p:cNvPr>
+          <p:cNvPicPr>
+            <a:picLocks noChangeAspect="1"/>
+          </p:cNvPicPr>
+          <p:nvPr/>
+        </p:nvPicPr>
+        <p:blipFill>
+          <a:blip r:embed="rId2"/>
+          <a:stretch>
+            <a:fillRect/>
+          </a:stretch>
+        </p:blipFill>
+        <p:spPr>
+          <a:xfrm>
+            <a:off x="964623" y="1485558"/>
+            <a:ext cx="3348738" cy="2692453"/>
+          </a:xfrm>
+          <a:prstGeom prst="rect">
+            <a:avLst/>
+          </a:prstGeom>
+        </p:spPr>
+      </p:pic>
+      <p:pic>
+        <p:nvPicPr>
+          <p:cNvPr id="7" name="Picture 6">
+            <a:extLst>
+              <a:ext uri="{FF2B5EF4-FFF2-40B4-BE49-F238E27FC236}">
+                <a16:creationId xmlns:a16="http://schemas.microsoft.com/office/drawing/2014/main" id="{E8FD18A8-E899-7935-7932-DE2D8F7C423F}"/>
+              </a:ext>
+            </a:extLst>
+          </p:cNvPr>
+          <p:cNvPicPr>
+            <a:picLocks noChangeAspect="1"/>
+          </p:cNvPicPr>
+          <p:nvPr/>
+        </p:nvPicPr>
+        <p:blipFill>
+          <a:blip r:embed="rId3"/>
+          <a:stretch>
+            <a:fillRect/>
+          </a:stretch>
+        </p:blipFill>
+        <p:spPr>
+          <a:xfrm>
+            <a:off x="4923706" y="1485558"/>
+            <a:ext cx="3525286" cy="2637624"/>
+          </a:xfrm>
+          <a:prstGeom prst="rect">
+            <a:avLst/>
+          </a:prstGeom>
+        </p:spPr>
+      </p:pic>
+      <p:sp>
+        <p:nvSpPr>
+          <p:cNvPr id="9" name="TextBox 8">
+            <a:extLst>
+              <a:ext uri="{FF2B5EF4-FFF2-40B4-BE49-F238E27FC236}">
+                <a16:creationId xmlns:a16="http://schemas.microsoft.com/office/drawing/2014/main" id="{DA37AE87-05F6-5C1B-D5D8-6816962ABC25}"/>
+              </a:ext>
+            </a:extLst>
+          </p:cNvPr>
+          <p:cNvSpPr txBox="1"/>
+          <p:nvPr/>
+        </p:nvSpPr>
+        <p:spPr>
+          <a:xfrm rot="16200000">
+            <a:off x="524386" y="2624142"/>
+            <a:ext cx="572700" cy="246221"/>
+          </a:xfrm>
+          <a:prstGeom prst="rect">
+            <a:avLst/>
+          </a:prstGeom>
+          <a:noFill/>
+        </p:spPr>
+        <p:txBody>
+          <a:bodyPr wrap="square">
+            <a:spAutoFit/>
+          </a:bodyPr>
+          <a:lstStyle/>
+          <a:p>
+            <a:r>
+              <a:rPr lang="en-US" sz="1000" dirty="0"/>
+              <a:t>Fresh</a:t>
+            </a:r>
+          </a:p>
+        </p:txBody>
+      </p:sp>
+      <p:sp>
+        <p:nvSpPr>
+          <p:cNvPr id="10" name="TextBox 9">
+            <a:extLst>
+              <a:ext uri="{FF2B5EF4-FFF2-40B4-BE49-F238E27FC236}">
+                <a16:creationId xmlns:a16="http://schemas.microsoft.com/office/drawing/2014/main" id="{CC788E07-0AC2-CD5E-C958-4AE04C9B95F5}"/>
+              </a:ext>
+            </a:extLst>
+          </p:cNvPr>
+          <p:cNvSpPr txBox="1"/>
+          <p:nvPr/>
+        </p:nvSpPr>
+        <p:spPr>
+          <a:xfrm>
+            <a:off x="2352642" y="4123182"/>
+            <a:ext cx="572700" cy="246221"/>
+          </a:xfrm>
+          <a:prstGeom prst="rect">
+            <a:avLst/>
+          </a:prstGeom>
+          <a:noFill/>
+        </p:spPr>
+        <p:txBody>
+          <a:bodyPr wrap="square">
+            <a:spAutoFit/>
+          </a:bodyPr>
+          <a:lstStyle/>
+          <a:p>
+            <a:r>
+              <a:rPr lang="en-US" sz="1000" dirty="0"/>
+              <a:t>Milk</a:t>
+            </a:r>
+          </a:p>
+        </p:txBody>
+      </p:sp>
+    </p:spTree>
+    <p:extLst>
+      <p:ext uri="{BB962C8B-B14F-4D97-AF65-F5344CB8AC3E}">
+        <p14:creationId xmlns:p14="http://schemas.microsoft.com/office/powerpoint/2010/main" val="2309986996"/>
+      </p:ext>
+    </p:extLst>
+  </p:cSld>
+  <p:clrMapOvr>
+    <a:masterClrMapping/>
+  </p:clrMapOvr>
+</p:sld>
+</file>
+
+<file path=ppt/slides/slide11.xml><?xml version="1.0" encoding="utf-8"?>
+<p:sld xmlns:a="http://schemas.openxmlformats.org/drawingml/2006/main" xmlns:r="http://schemas.openxmlformats.org/officeDocument/2006/relationships" xmlns:p="http://schemas.openxmlformats.org/presentationml/2006/main">
+  <p:cSld>
+    <p:spTree>
+      <p:nvGrpSpPr>
+        <p:cNvPr id="1" name=""/>
+        <p:cNvGrpSpPr/>
+        <p:nvPr/>
+      </p:nvGrpSpPr>
+      <p:grpSpPr>
+        <a:xfrm>
+          <a:off x="0" y="0"/>
+          <a:ext cx="0" cy="0"/>
+          <a:chOff x="0" y="0"/>
+          <a:chExt cx="0" cy="0"/>
+        </a:xfrm>
+      </p:grpSpPr>
+      <p:sp>
+        <p:nvSpPr>
+          <p:cNvPr id="2" name="Title 1">
+            <a:extLst>
+              <a:ext uri="{FF2B5EF4-FFF2-40B4-BE49-F238E27FC236}">
                 <a16:creationId xmlns:a16="http://schemas.microsoft.com/office/drawing/2014/main" id="{84125B74-D0CF-0905-7FF3-E8BA70BCDB11}"/>
               </a:ext>
             </a:extLst>
@@ -9093,7 +9355,97 @@
 </p:sld>
 </file>
 
-<file path=ppt/slides/slide11.xml><?xml version="1.0" encoding="utf-8"?>
+<file path=ppt/slides/slide12.xml><?xml version="1.0" encoding="utf-8"?>
+<p:sld xmlns:a="http://schemas.openxmlformats.org/drawingml/2006/main" xmlns:r="http://schemas.openxmlformats.org/officeDocument/2006/relationships" xmlns:p="http://schemas.openxmlformats.org/presentationml/2006/main">
+  <p:cSld>
+    <p:spTree>
+      <p:nvGrpSpPr>
+        <p:cNvPr id="1" name=""/>
+        <p:cNvGrpSpPr/>
+        <p:nvPr/>
+      </p:nvGrpSpPr>
+      <p:grpSpPr>
+        <a:xfrm>
+          <a:off x="0" y="0"/>
+          <a:ext cx="0" cy="0"/>
+          <a:chOff x="0" y="0"/>
+          <a:chExt cx="0" cy="0"/>
+        </a:xfrm>
+      </p:grpSpPr>
+      <p:sp>
+        <p:nvSpPr>
+          <p:cNvPr id="2" name="Title 1">
+            <a:extLst>
+              <a:ext uri="{FF2B5EF4-FFF2-40B4-BE49-F238E27FC236}">
+                <a16:creationId xmlns:a16="http://schemas.microsoft.com/office/drawing/2014/main" id="{B1095DA5-BBA7-4730-48AC-DF5AF1CE10C0}"/>
+              </a:ext>
+            </a:extLst>
+          </p:cNvPr>
+          <p:cNvSpPr>
+            <a:spLocks noGrp="1"/>
+          </p:cNvSpPr>
+          <p:nvPr>
+            <p:ph type="title"/>
+          </p:nvPr>
+        </p:nvSpPr>
+        <p:spPr/>
+        <p:txBody>
+          <a:bodyPr>
+            <a:normAutofit fontScale="90000"/>
+          </a:bodyPr>
+          <a:lstStyle/>
+          <a:p>
+            <a:r>
+              <a:rPr lang="en-US" dirty="0"/>
+              <a:t>Final Plot After Reducing Features using PCA</a:t>
+            </a:r>
+          </a:p>
+        </p:txBody>
+      </p:sp>
+      <p:pic>
+        <p:nvPicPr>
+          <p:cNvPr id="5" name="Picture 4">
+            <a:extLst>
+              <a:ext uri="{FF2B5EF4-FFF2-40B4-BE49-F238E27FC236}">
+                <a16:creationId xmlns:a16="http://schemas.microsoft.com/office/drawing/2014/main" id="{B215A1BB-DC14-7AAD-83A7-CB7728E30E51}"/>
+              </a:ext>
+            </a:extLst>
+          </p:cNvPr>
+          <p:cNvPicPr>
+            <a:picLocks noChangeAspect="1"/>
+          </p:cNvPicPr>
+          <p:nvPr/>
+        </p:nvPicPr>
+        <p:blipFill>
+          <a:blip r:embed="rId2"/>
+          <a:stretch>
+            <a:fillRect/>
+          </a:stretch>
+        </p:blipFill>
+        <p:spPr>
+          <a:xfrm>
+            <a:off x="1884946" y="1217873"/>
+            <a:ext cx="5349205" cy="3925627"/>
+          </a:xfrm>
+          <a:prstGeom prst="rect">
+            <a:avLst/>
+          </a:prstGeom>
+        </p:spPr>
+      </p:pic>
+    </p:spTree>
+    <p:extLst>
+      <p:ext uri="{BB962C8B-B14F-4D97-AF65-F5344CB8AC3E}">
+        <p14:creationId xmlns:p14="http://schemas.microsoft.com/office/powerpoint/2010/main" val="2039418008"/>
+      </p:ext>
+    </p:extLst>
+  </p:cSld>
+  <p:clrMapOvr>
+    <a:masterClrMapping/>
+  </p:clrMapOvr>
+</p:sld>
+</file>
+
+<file path=ppt/slides/slide13.xml><?xml version="1.0" encoding="utf-8"?>
 <p:sld xmlns:a="http://schemas.openxmlformats.org/drawingml/2006/main" xmlns:r="http://schemas.openxmlformats.org/officeDocument/2006/relationships" xmlns:p="http://schemas.openxmlformats.org/presentationml/2006/main">
   <p:cSld>
     <p:spTree>
@@ -9245,7 +9597,7 @@
 </p:sld>
 </file>
 
-<file path=ppt/slides/slide12.xml><?xml version="1.0" encoding="utf-8"?>
+<file path=ppt/slides/slide14.xml><?xml version="1.0" encoding="utf-8"?>
 <p:sld xmlns:a="http://schemas.openxmlformats.org/drawingml/2006/main" xmlns:r="http://schemas.openxmlformats.org/officeDocument/2006/relationships" xmlns:p="http://schemas.openxmlformats.org/presentationml/2006/main">
   <p:cSld>
     <p:spTree>
@@ -9821,6 +10173,96 @@
           <p:cNvPr id="2" name="Title 1">
             <a:extLst>
               <a:ext uri="{FF2B5EF4-FFF2-40B4-BE49-F238E27FC236}">
+                <a16:creationId xmlns:a16="http://schemas.microsoft.com/office/drawing/2014/main" id="{D2883BE4-6A12-AED7-BAA1-1014E1D918E2}"/>
+              </a:ext>
+            </a:extLst>
+          </p:cNvPr>
+          <p:cNvSpPr>
+            <a:spLocks noGrp="1"/>
+          </p:cNvSpPr>
+          <p:nvPr>
+            <p:ph type="title"/>
+          </p:nvPr>
+        </p:nvSpPr>
+        <p:spPr/>
+        <p:txBody>
+          <a:bodyPr>
+            <a:normAutofit fontScale="90000"/>
+          </a:bodyPr>
+          <a:lstStyle/>
+          <a:p>
+            <a:r>
+              <a:rPr lang="en-US" dirty="0"/>
+              <a:t>Histogram Plot After Log Transform</a:t>
+            </a:r>
+          </a:p>
+        </p:txBody>
+      </p:sp>
+      <p:pic>
+        <p:nvPicPr>
+          <p:cNvPr id="5" name="Picture 4">
+            <a:extLst>
+              <a:ext uri="{FF2B5EF4-FFF2-40B4-BE49-F238E27FC236}">
+                <a16:creationId xmlns:a16="http://schemas.microsoft.com/office/drawing/2014/main" id="{001991E6-92E9-B4D0-AADA-103E47B1B880}"/>
+              </a:ext>
+            </a:extLst>
+          </p:cNvPr>
+          <p:cNvPicPr>
+            <a:picLocks noChangeAspect="1"/>
+          </p:cNvPicPr>
+          <p:nvPr/>
+        </p:nvPicPr>
+        <p:blipFill>
+          <a:blip r:embed="rId2"/>
+          <a:stretch>
+            <a:fillRect/>
+          </a:stretch>
+        </p:blipFill>
+        <p:spPr>
+          <a:xfrm>
+            <a:off x="1764631" y="1152475"/>
+            <a:ext cx="5414267" cy="3798517"/>
+          </a:xfrm>
+          <a:prstGeom prst="rect">
+            <a:avLst/>
+          </a:prstGeom>
+        </p:spPr>
+      </p:pic>
+    </p:spTree>
+    <p:extLst>
+      <p:ext uri="{BB962C8B-B14F-4D97-AF65-F5344CB8AC3E}">
+        <p14:creationId xmlns:p14="http://schemas.microsoft.com/office/powerpoint/2010/main" val="623687260"/>
+      </p:ext>
+    </p:extLst>
+  </p:cSld>
+  <p:clrMapOvr>
+    <a:masterClrMapping/>
+  </p:clrMapOvr>
+</p:sld>
+</file>
+
+<file path=ppt/slides/slide7.xml><?xml version="1.0" encoding="utf-8"?>
+<p:sld xmlns:a="http://schemas.openxmlformats.org/drawingml/2006/main" xmlns:r="http://schemas.openxmlformats.org/officeDocument/2006/relationships" xmlns:p="http://schemas.openxmlformats.org/presentationml/2006/main">
+  <p:cSld>
+    <p:spTree>
+      <p:nvGrpSpPr>
+        <p:cNvPr id="1" name=""/>
+        <p:cNvGrpSpPr/>
+        <p:nvPr/>
+      </p:nvGrpSpPr>
+      <p:grpSpPr>
+        <a:xfrm>
+          <a:off x="0" y="0"/>
+          <a:ext cx="0" cy="0"/>
+          <a:chOff x="0" y="0"/>
+          <a:chExt cx="0" cy="0"/>
+        </a:xfrm>
+      </p:grpSpPr>
+      <p:sp>
+        <p:nvSpPr>
+          <p:cNvPr id="2" name="Title 1">
+            <a:extLst>
+              <a:ext uri="{FF2B5EF4-FFF2-40B4-BE49-F238E27FC236}">
                 <a16:creationId xmlns:a16="http://schemas.microsoft.com/office/drawing/2014/main" id="{833216EA-1734-9E26-C3D3-10BC22B9C8B3}"/>
               </a:ext>
             </a:extLst>
@@ -9946,7 +10388,7 @@
 </p:sld>
 </file>
 
-<file path=ppt/slides/slide7.xml><?xml version="1.0" encoding="utf-8"?>
+<file path=ppt/slides/slide8.xml><?xml version="1.0" encoding="utf-8"?>
 <p:sld xmlns:a="http://schemas.openxmlformats.org/drawingml/2006/main" xmlns:r="http://schemas.openxmlformats.org/officeDocument/2006/relationships" xmlns:p="http://schemas.openxmlformats.org/presentationml/2006/main">
   <p:cSld>
     <p:spTree>
@@ -10126,7 +10568,7 @@
 </p:sld>
 </file>
 
-<file path=ppt/slides/slide8.xml><?xml version="1.0" encoding="utf-8"?>
+<file path=ppt/slides/slide9.xml><?xml version="1.0" encoding="utf-8"?>
 <p:sld xmlns:a="http://schemas.openxmlformats.org/drawingml/2006/main" xmlns:r="http://schemas.openxmlformats.org/officeDocument/2006/relationships" xmlns:p="http://schemas.openxmlformats.org/presentationml/2006/main">
   <p:cSld>
     <p:spTree>
@@ -10192,7 +10634,7 @@
         </p:nvSpPr>
         <p:spPr>
           <a:xfrm>
-            <a:off x="4135822" y="1471850"/>
+            <a:off x="4373983" y="1471850"/>
             <a:ext cx="4105004" cy="338554"/>
           </a:xfrm>
           <a:prstGeom prst="rect">
@@ -10318,195 +10760,6 @@
     <p:extLst>
       <p:ext uri="{BB962C8B-B14F-4D97-AF65-F5344CB8AC3E}">
         <p14:creationId xmlns:p14="http://schemas.microsoft.com/office/powerpoint/2010/main" val="3400650875"/>
-      </p:ext>
-    </p:extLst>
-  </p:cSld>
-  <p:clrMapOvr>
-    <a:masterClrMapping/>
-  </p:clrMapOvr>
-</p:sld>
-</file>
-
-<file path=ppt/slides/slide9.xml><?xml version="1.0" encoding="utf-8"?>
-<p:sld xmlns:a="http://schemas.openxmlformats.org/drawingml/2006/main" xmlns:r="http://schemas.openxmlformats.org/officeDocument/2006/relationships" xmlns:p="http://schemas.openxmlformats.org/presentationml/2006/main">
-  <p:cSld>
-    <p:spTree>
-      <p:nvGrpSpPr>
-        <p:cNvPr id="1" name=""/>
-        <p:cNvGrpSpPr/>
-        <p:nvPr/>
-      </p:nvGrpSpPr>
-      <p:grpSpPr>
-        <a:xfrm>
-          <a:off x="0" y="0"/>
-          <a:ext cx="0" cy="0"/>
-          <a:chOff x="0" y="0"/>
-          <a:chExt cx="0" cy="0"/>
-        </a:xfrm>
-      </p:grpSpPr>
-      <p:sp>
-        <p:nvSpPr>
-          <p:cNvPr id="2" name="Title 1">
-            <a:extLst>
-              <a:ext uri="{FF2B5EF4-FFF2-40B4-BE49-F238E27FC236}">
-                <a16:creationId xmlns:a16="http://schemas.microsoft.com/office/drawing/2014/main" id="{F99DA8C7-737E-29AF-3BA3-6D58A54486CD}"/>
-              </a:ext>
-            </a:extLst>
-          </p:cNvPr>
-          <p:cNvSpPr>
-            <a:spLocks noGrp="1"/>
-          </p:cNvSpPr>
-          <p:nvPr>
-            <p:ph type="title"/>
-          </p:nvPr>
-        </p:nvSpPr>
-        <p:spPr/>
-        <p:txBody>
-          <a:bodyPr>
-            <a:normAutofit fontScale="90000"/>
-          </a:bodyPr>
-          <a:lstStyle/>
-          <a:p>
-            <a:r>
-              <a:rPr lang="en-US" dirty="0"/>
-              <a:t>Result of Clustering – K-Means &amp; Hierarchical</a:t>
-            </a:r>
-          </a:p>
-        </p:txBody>
-      </p:sp>
-      <p:pic>
-        <p:nvPicPr>
-          <p:cNvPr id="5" name="Picture 4">
-            <a:extLst>
-              <a:ext uri="{FF2B5EF4-FFF2-40B4-BE49-F238E27FC236}">
-                <a16:creationId xmlns:a16="http://schemas.microsoft.com/office/drawing/2014/main" id="{995F5AA8-92D6-CB1B-2A58-0DE41F89B6D4}"/>
-              </a:ext>
-            </a:extLst>
-          </p:cNvPr>
-          <p:cNvPicPr>
-            <a:picLocks noChangeAspect="1"/>
-          </p:cNvPicPr>
-          <p:nvPr/>
-        </p:nvPicPr>
-        <p:blipFill rotWithShape="1">
-          <a:blip r:embed="rId2"/>
-          <a:srcRect l="12883" t="12430" r="11466" b="51979"/>
-          <a:stretch/>
-        </p:blipFill>
-        <p:spPr>
-          <a:xfrm>
-            <a:off x="199879" y="1330783"/>
-            <a:ext cx="4372121" cy="3091533"/>
-          </a:xfrm>
-          <a:prstGeom prst="rect">
-            <a:avLst/>
-          </a:prstGeom>
-        </p:spPr>
-      </p:pic>
-      <p:pic>
-        <p:nvPicPr>
-          <p:cNvPr id="8" name="Picture 7">
-            <a:extLst>
-              <a:ext uri="{FF2B5EF4-FFF2-40B4-BE49-F238E27FC236}">
-                <a16:creationId xmlns:a16="http://schemas.microsoft.com/office/drawing/2014/main" id="{7A6E54F3-2C78-2515-EF3A-0F5563D0BF94}"/>
-              </a:ext>
-            </a:extLst>
-          </p:cNvPr>
-          <p:cNvPicPr>
-            <a:picLocks noChangeAspect="1"/>
-          </p:cNvPicPr>
-          <p:nvPr/>
-        </p:nvPicPr>
-        <p:blipFill>
-          <a:blip r:embed="rId3"/>
-          <a:stretch>
-            <a:fillRect/>
-          </a:stretch>
-        </p:blipFill>
-        <p:spPr>
-          <a:xfrm>
-            <a:off x="4722125" y="1392072"/>
-            <a:ext cx="4035755" cy="2846743"/>
-          </a:xfrm>
-          <a:prstGeom prst="rect">
-            <a:avLst/>
-          </a:prstGeom>
-        </p:spPr>
-      </p:pic>
-      <p:sp>
-        <p:nvSpPr>
-          <p:cNvPr id="12" name="TextBox 11">
-            <a:extLst>
-              <a:ext uri="{FF2B5EF4-FFF2-40B4-BE49-F238E27FC236}">
-                <a16:creationId xmlns:a16="http://schemas.microsoft.com/office/drawing/2014/main" id="{D037D60A-3D91-A6D8-82F9-41331E6A2313}"/>
-              </a:ext>
-            </a:extLst>
-          </p:cNvPr>
-          <p:cNvSpPr txBox="1"/>
-          <p:nvPr/>
-        </p:nvSpPr>
-        <p:spPr>
-          <a:xfrm>
-            <a:off x="1972102" y="4497252"/>
-            <a:ext cx="1194179" cy="307777"/>
-          </a:xfrm>
-          <a:prstGeom prst="rect">
-            <a:avLst/>
-          </a:prstGeom>
-          <a:noFill/>
-        </p:spPr>
-        <p:txBody>
-          <a:bodyPr wrap="square">
-            <a:spAutoFit/>
-          </a:bodyPr>
-          <a:lstStyle/>
-          <a:p>
-            <a:r>
-              <a:rPr lang="en-US" dirty="0"/>
-              <a:t>K-Means</a:t>
-            </a:r>
-          </a:p>
-        </p:txBody>
-      </p:sp>
-      <p:sp>
-        <p:nvSpPr>
-          <p:cNvPr id="13" name="TextBox 12">
-            <a:extLst>
-              <a:ext uri="{FF2B5EF4-FFF2-40B4-BE49-F238E27FC236}">
-                <a16:creationId xmlns:a16="http://schemas.microsoft.com/office/drawing/2014/main" id="{A3FC82B7-AD11-C0DB-16C4-01A1FD87A27D}"/>
-              </a:ext>
-            </a:extLst>
-          </p:cNvPr>
-          <p:cNvSpPr txBox="1"/>
-          <p:nvPr/>
-        </p:nvSpPr>
-        <p:spPr>
-          <a:xfrm>
-            <a:off x="6405349" y="4422316"/>
-            <a:ext cx="1241946" cy="307777"/>
-          </a:xfrm>
-          <a:prstGeom prst="rect">
-            <a:avLst/>
-          </a:prstGeom>
-          <a:noFill/>
-        </p:spPr>
-        <p:txBody>
-          <a:bodyPr wrap="square">
-            <a:spAutoFit/>
-          </a:bodyPr>
-          <a:lstStyle/>
-          <a:p>
-            <a:r>
-              <a:rPr lang="en-US" dirty="0"/>
-              <a:t>Hierarchical</a:t>
-            </a:r>
-          </a:p>
-        </p:txBody>
-      </p:sp>
-    </p:spTree>
-    <p:extLst>
-      <p:ext uri="{BB962C8B-B14F-4D97-AF65-F5344CB8AC3E}">
-        <p14:creationId xmlns:p14="http://schemas.microsoft.com/office/powerpoint/2010/main" val="2309986996"/>
       </p:ext>
     </p:extLst>
   </p:cSld>

</xml_diff>